<commit_message>
last corrections to ppt
</commit_message>
<xml_diff>
--- a/Slide_Project.pptx
+++ b/Slide_Project.pptx
@@ -247,7 +247,7 @@
           <a:p>
             <a:fld id="{0914F915-DDDE-4CAA-895D-614564BB8837}" type="datetimeFigureOut">
               <a:rPr lang="en-GB" smtClean="0"/>
-              <a:t>13/03/2023</a:t>
+              <a:t>14/03/2023</a:t>
             </a:fld>
             <a:endParaRPr lang="en-GB"/>
           </a:p>
@@ -412,7 +412,7 @@
           <a:p>
             <a:fld id="{A9D4C5A5-33D0-4441-96FE-163C8B7C9D3F}" type="datetimeFigureOut">
               <a:rPr lang="en-GB" smtClean="0"/>
-              <a:t>13/03/2023</a:t>
+              <a:t>14/03/2023</a:t>
             </a:fld>
             <a:endParaRPr lang="en-GB"/>
           </a:p>
@@ -859,7 +859,7 @@
           <a:p>
             <a:fld id="{2C790A91-0F3D-9944-94EF-F5C93CDE0643}" type="datetimeFigureOut">
               <a:rPr lang="it-IT" smtClean="0"/>
-              <a:t>13/03/2023</a:t>
+              <a:t>14/03/2023</a:t>
             </a:fld>
             <a:endParaRPr lang="it-IT"/>
           </a:p>
@@ -917,6 +917,18 @@
   <p:clrMapOvr>
     <a:masterClrMapping/>
   </p:clrMapOvr>
+  <mc:AlternateContent xmlns:mc="http://schemas.openxmlformats.org/markup-compatibility/2006" xmlns:p14="http://schemas.microsoft.com/office/powerpoint/2010/main">
+    <mc:Choice Requires="p14">
+      <p:transition spd="slow" p14:dur="1300">
+        <p14:pan dir="u"/>
+      </p:transition>
+    </mc:Choice>
+    <mc:Fallback xmlns="">
+      <p:transition spd="slow">
+        <p:fade/>
+      </p:transition>
+    </mc:Fallback>
+  </mc:AlternateContent>
 </p:sldLayout>
 </file>
 
@@ -1027,7 +1039,7 @@
           <a:p>
             <a:fld id="{2C790A91-0F3D-9944-94EF-F5C93CDE0643}" type="datetimeFigureOut">
               <a:rPr lang="it-IT" smtClean="0"/>
-              <a:t>13/03/2023</a:t>
+              <a:t>14/03/2023</a:t>
             </a:fld>
             <a:endParaRPr lang="it-IT"/>
           </a:p>
@@ -1085,6 +1097,18 @@
   <p:clrMapOvr>
     <a:masterClrMapping/>
   </p:clrMapOvr>
+  <mc:AlternateContent xmlns:mc="http://schemas.openxmlformats.org/markup-compatibility/2006" xmlns:p14="http://schemas.microsoft.com/office/powerpoint/2010/main">
+    <mc:Choice Requires="p14">
+      <p:transition spd="slow" p14:dur="1300">
+        <p14:pan dir="u"/>
+      </p:transition>
+    </mc:Choice>
+    <mc:Fallback xmlns="">
+      <p:transition spd="slow">
+        <p:fade/>
+      </p:transition>
+    </mc:Fallback>
+  </mc:AlternateContent>
 </p:sldLayout>
 </file>
 
@@ -1205,7 +1229,7 @@
           <a:p>
             <a:fld id="{2C790A91-0F3D-9944-94EF-F5C93CDE0643}" type="datetimeFigureOut">
               <a:rPr lang="it-IT" smtClean="0"/>
-              <a:t>13/03/2023</a:t>
+              <a:t>14/03/2023</a:t>
             </a:fld>
             <a:endParaRPr lang="it-IT"/>
           </a:p>
@@ -1263,6 +1287,18 @@
   <p:clrMapOvr>
     <a:masterClrMapping/>
   </p:clrMapOvr>
+  <mc:AlternateContent xmlns:mc="http://schemas.openxmlformats.org/markup-compatibility/2006" xmlns:p14="http://schemas.microsoft.com/office/powerpoint/2010/main">
+    <mc:Choice Requires="p14">
+      <p:transition spd="slow" p14:dur="1300">
+        <p14:pan dir="u"/>
+      </p:transition>
+    </mc:Choice>
+    <mc:Fallback xmlns="">
+      <p:transition spd="slow">
+        <p:fade/>
+      </p:transition>
+    </mc:Fallback>
+  </mc:AlternateContent>
 </p:sldLayout>
 </file>
 
@@ -1373,7 +1409,7 @@
           <a:p>
             <a:fld id="{2C790A91-0F3D-9944-94EF-F5C93CDE0643}" type="datetimeFigureOut">
               <a:rPr lang="it-IT" smtClean="0"/>
-              <a:t>13/03/2023</a:t>
+              <a:t>14/03/2023</a:t>
             </a:fld>
             <a:endParaRPr lang="it-IT"/>
           </a:p>
@@ -1431,6 +1467,18 @@
   <p:clrMapOvr>
     <a:masterClrMapping/>
   </p:clrMapOvr>
+  <mc:AlternateContent xmlns:mc="http://schemas.openxmlformats.org/markup-compatibility/2006" xmlns:p14="http://schemas.microsoft.com/office/powerpoint/2010/main">
+    <mc:Choice Requires="p14">
+      <p:transition spd="slow" p14:dur="1300">
+        <p14:pan dir="u"/>
+      </p:transition>
+    </mc:Choice>
+    <mc:Fallback xmlns="">
+      <p:transition spd="slow">
+        <p:fade/>
+      </p:transition>
+    </mc:Fallback>
+  </mc:AlternateContent>
 </p:sldLayout>
 </file>
 
@@ -1618,7 +1666,7 @@
           <a:p>
             <a:fld id="{2C790A91-0F3D-9944-94EF-F5C93CDE0643}" type="datetimeFigureOut">
               <a:rPr lang="it-IT" smtClean="0"/>
-              <a:t>13/03/2023</a:t>
+              <a:t>14/03/2023</a:t>
             </a:fld>
             <a:endParaRPr lang="it-IT"/>
           </a:p>
@@ -1676,6 +1724,18 @@
   <p:clrMapOvr>
     <a:masterClrMapping/>
   </p:clrMapOvr>
+  <mc:AlternateContent xmlns:mc="http://schemas.openxmlformats.org/markup-compatibility/2006" xmlns:p14="http://schemas.microsoft.com/office/powerpoint/2010/main">
+    <mc:Choice Requires="p14">
+      <p:transition spd="slow" p14:dur="1300">
+        <p14:pan dir="u"/>
+      </p:transition>
+    </mc:Choice>
+    <mc:Fallback xmlns="">
+      <p:transition spd="slow">
+        <p:fade/>
+      </p:transition>
+    </mc:Fallback>
+  </mc:AlternateContent>
 </p:sldLayout>
 </file>
 
@@ -1903,7 +1963,7 @@
           <a:p>
             <a:fld id="{2C790A91-0F3D-9944-94EF-F5C93CDE0643}" type="datetimeFigureOut">
               <a:rPr lang="it-IT" smtClean="0"/>
-              <a:t>13/03/2023</a:t>
+              <a:t>14/03/2023</a:t>
             </a:fld>
             <a:endParaRPr lang="it-IT"/>
           </a:p>
@@ -1961,6 +2021,18 @@
   <p:clrMapOvr>
     <a:masterClrMapping/>
   </p:clrMapOvr>
+  <mc:AlternateContent xmlns:mc="http://schemas.openxmlformats.org/markup-compatibility/2006" xmlns:p14="http://schemas.microsoft.com/office/powerpoint/2010/main">
+    <mc:Choice Requires="p14">
+      <p:transition spd="slow" p14:dur="1300">
+        <p14:pan dir="u"/>
+      </p:transition>
+    </mc:Choice>
+    <mc:Fallback xmlns="">
+      <p:transition spd="slow">
+        <p:fade/>
+      </p:transition>
+    </mc:Fallback>
+  </mc:AlternateContent>
 </p:sldLayout>
 </file>
 
@@ -2322,7 +2394,7 @@
           <a:p>
             <a:fld id="{2C790A91-0F3D-9944-94EF-F5C93CDE0643}" type="datetimeFigureOut">
               <a:rPr lang="it-IT" smtClean="0"/>
-              <a:t>13/03/2023</a:t>
+              <a:t>14/03/2023</a:t>
             </a:fld>
             <a:endParaRPr lang="it-IT"/>
           </a:p>
@@ -2380,6 +2452,18 @@
   <p:clrMapOvr>
     <a:masterClrMapping/>
   </p:clrMapOvr>
+  <mc:AlternateContent xmlns:mc="http://schemas.openxmlformats.org/markup-compatibility/2006" xmlns:p14="http://schemas.microsoft.com/office/powerpoint/2010/main">
+    <mc:Choice Requires="p14">
+      <p:transition spd="slow" p14:dur="1300">
+        <p14:pan dir="u"/>
+      </p:transition>
+    </mc:Choice>
+    <mc:Fallback xmlns="">
+      <p:transition spd="slow">
+        <p:fade/>
+      </p:transition>
+    </mc:Fallback>
+  </mc:AlternateContent>
 </p:sldLayout>
 </file>
 
@@ -2439,7 +2523,7 @@
           <a:p>
             <a:fld id="{2C790A91-0F3D-9944-94EF-F5C93CDE0643}" type="datetimeFigureOut">
               <a:rPr lang="it-IT" smtClean="0"/>
-              <a:t>13/03/2023</a:t>
+              <a:t>14/03/2023</a:t>
             </a:fld>
             <a:endParaRPr lang="it-IT"/>
           </a:p>
@@ -2497,6 +2581,18 @@
   <p:clrMapOvr>
     <a:masterClrMapping/>
   </p:clrMapOvr>
+  <mc:AlternateContent xmlns:mc="http://schemas.openxmlformats.org/markup-compatibility/2006" xmlns:p14="http://schemas.microsoft.com/office/powerpoint/2010/main">
+    <mc:Choice Requires="p14">
+      <p:transition spd="slow" p14:dur="1300">
+        <p14:pan dir="u"/>
+      </p:transition>
+    </mc:Choice>
+    <mc:Fallback xmlns="">
+      <p:transition spd="slow">
+        <p:fade/>
+      </p:transition>
+    </mc:Fallback>
+  </mc:AlternateContent>
 </p:sldLayout>
 </file>
 
@@ -2534,7 +2630,7 @@
           <a:p>
             <a:fld id="{2C790A91-0F3D-9944-94EF-F5C93CDE0643}" type="datetimeFigureOut">
               <a:rPr lang="it-IT" smtClean="0"/>
-              <a:t>13/03/2023</a:t>
+              <a:t>14/03/2023</a:t>
             </a:fld>
             <a:endParaRPr lang="it-IT"/>
           </a:p>
@@ -2592,6 +2688,18 @@
   <p:clrMapOvr>
     <a:masterClrMapping/>
   </p:clrMapOvr>
+  <mc:AlternateContent xmlns:mc="http://schemas.openxmlformats.org/markup-compatibility/2006" xmlns:p14="http://schemas.microsoft.com/office/powerpoint/2010/main">
+    <mc:Choice Requires="p14">
+      <p:transition spd="slow" p14:dur="1300">
+        <p14:pan dir="u"/>
+      </p:transition>
+    </mc:Choice>
+    <mc:Fallback xmlns="">
+      <p:transition spd="slow">
+        <p:fade/>
+      </p:transition>
+    </mc:Fallback>
+  </mc:AlternateContent>
 </p:sldLayout>
 </file>
 
@@ -2809,7 +2917,7 @@
           <a:p>
             <a:fld id="{2C790A91-0F3D-9944-94EF-F5C93CDE0643}" type="datetimeFigureOut">
               <a:rPr lang="it-IT" smtClean="0"/>
-              <a:t>13/03/2023</a:t>
+              <a:t>14/03/2023</a:t>
             </a:fld>
             <a:endParaRPr lang="it-IT"/>
           </a:p>
@@ -2867,6 +2975,18 @@
   <p:clrMapOvr>
     <a:masterClrMapping/>
   </p:clrMapOvr>
+  <mc:AlternateContent xmlns:mc="http://schemas.openxmlformats.org/markup-compatibility/2006" xmlns:p14="http://schemas.microsoft.com/office/powerpoint/2010/main">
+    <mc:Choice Requires="p14">
+      <p:transition spd="slow" p14:dur="1300">
+        <p14:pan dir="u"/>
+      </p:transition>
+    </mc:Choice>
+    <mc:Fallback xmlns="">
+      <p:transition spd="slow">
+        <p:fade/>
+      </p:transition>
+    </mc:Fallback>
+  </mc:AlternateContent>
 </p:sldLayout>
 </file>
 
@@ -3061,7 +3181,7 @@
           <a:p>
             <a:fld id="{2C790A91-0F3D-9944-94EF-F5C93CDE0643}" type="datetimeFigureOut">
               <a:rPr lang="it-IT" smtClean="0"/>
-              <a:t>13/03/2023</a:t>
+              <a:t>14/03/2023</a:t>
             </a:fld>
             <a:endParaRPr lang="it-IT"/>
           </a:p>
@@ -3119,6 +3239,18 @@
   <p:clrMapOvr>
     <a:masterClrMapping/>
   </p:clrMapOvr>
+  <mc:AlternateContent xmlns:mc="http://schemas.openxmlformats.org/markup-compatibility/2006" xmlns:p14="http://schemas.microsoft.com/office/powerpoint/2010/main">
+    <mc:Choice Requires="p14">
+      <p:transition spd="slow" p14:dur="1300">
+        <p14:pan dir="u"/>
+      </p:transition>
+    </mc:Choice>
+    <mc:Fallback xmlns="">
+      <p:transition spd="slow">
+        <p:fade/>
+      </p:transition>
+    </mc:Fallback>
+  </mc:AlternateContent>
 </p:sldLayout>
 </file>
 
@@ -3272,7 +3404,7 @@
           <a:p>
             <a:fld id="{2C790A91-0F3D-9944-94EF-F5C93CDE0643}" type="datetimeFigureOut">
               <a:rPr lang="it-IT" smtClean="0"/>
-              <a:t>13/03/2023</a:t>
+              <a:t>14/03/2023</a:t>
             </a:fld>
             <a:endParaRPr lang="it-IT"/>
           </a:p>
@@ -3377,6 +3509,18 @@
     <p:sldLayoutId id="2147483658" r:id="rId10"/>
     <p:sldLayoutId id="2147483659" r:id="rId11"/>
   </p:sldLayoutIdLst>
+  <mc:AlternateContent xmlns:mc="http://schemas.openxmlformats.org/markup-compatibility/2006" xmlns:p14="http://schemas.microsoft.com/office/powerpoint/2010/main">
+    <mc:Choice Requires="p14">
+      <p:transition spd="slow" p14:dur="1300">
+        <p14:pan dir="u"/>
+      </p:transition>
+    </mc:Choice>
+    <mc:Fallback xmlns="">
+      <p:transition spd="slow">
+        <p:fade/>
+      </p:transition>
+    </mc:Fallback>
+  </mc:AlternateContent>
   <p:txStyles>
     <p:titleStyle>
       <a:lvl1pPr algn="ctr" defTabSz="457200" rtl="0" eaLnBrk="1" latinLnBrk="0" hangingPunct="1">
@@ -4086,8 +4230,8 @@
   </p:clrMapOvr>
   <mc:AlternateContent xmlns:mc="http://schemas.openxmlformats.org/markup-compatibility/2006" xmlns:p14="http://schemas.microsoft.com/office/powerpoint/2010/main">
     <mc:Choice Requires="p14">
-      <p:transition spd="slow" p14:dur="1200">
-        <p14:prism/>
+      <p:transition spd="slow" p14:dur="1300">
+        <p14:pan dir="u"/>
       </p:transition>
     </mc:Choice>
     <mc:Fallback xmlns="">
@@ -4526,8 +4670,8 @@
   </p:clrMapOvr>
   <mc:AlternateContent xmlns:mc="http://schemas.openxmlformats.org/markup-compatibility/2006" xmlns:p14="http://schemas.microsoft.com/office/powerpoint/2010/main">
     <mc:Choice Requires="p14">
-      <p:transition spd="slow" p14:dur="1200">
-        <p14:prism/>
+      <p:transition spd="slow" p14:dur="1300">
+        <p14:pan dir="u"/>
       </p:transition>
     </mc:Choice>
     <mc:Fallback xmlns="">
@@ -4959,8 +5103,8 @@
   </p:clrMapOvr>
   <mc:AlternateContent xmlns:mc="http://schemas.openxmlformats.org/markup-compatibility/2006" xmlns:p14="http://schemas.microsoft.com/office/powerpoint/2010/main">
     <mc:Choice Requires="p14">
-      <p:transition spd="slow" p14:dur="1200">
-        <p14:prism/>
+      <p:transition spd="slow" p14:dur="1300">
+        <p14:pan dir="u"/>
       </p:transition>
     </mc:Choice>
     <mc:Fallback xmlns="">
@@ -5459,8 +5603,8 @@
   </p:clrMapOvr>
   <mc:AlternateContent xmlns:mc="http://schemas.openxmlformats.org/markup-compatibility/2006" xmlns:p14="http://schemas.microsoft.com/office/powerpoint/2010/main">
     <mc:Choice Requires="p14">
-      <p:transition spd="slow" p14:dur="1200">
-        <p14:prism/>
+      <p:transition spd="slow" p14:dur="1300">
+        <p14:pan dir="u"/>
       </p:transition>
     </mc:Choice>
     <mc:Fallback xmlns="">
@@ -6137,8 +6281,8 @@
   </p:clrMapOvr>
   <mc:AlternateContent xmlns:mc="http://schemas.openxmlformats.org/markup-compatibility/2006" xmlns:p14="http://schemas.microsoft.com/office/powerpoint/2010/main">
     <mc:Choice Requires="p14">
-      <p:transition spd="slow" p14:dur="1200">
-        <p14:prism/>
+      <p:transition spd="slow" p14:dur="1300">
+        <p14:pan dir="u"/>
       </p:transition>
     </mc:Choice>
     <mc:Fallback xmlns="">
@@ -7063,8 +7207,8 @@
   </p:clrMapOvr>
   <mc:AlternateContent xmlns:mc="http://schemas.openxmlformats.org/markup-compatibility/2006" xmlns:p14="http://schemas.microsoft.com/office/powerpoint/2010/main">
     <mc:Choice Requires="p14">
-      <p:transition spd="slow" p14:dur="1200">
-        <p14:prism/>
+      <p:transition spd="slow" p14:dur="1300">
+        <p14:pan dir="u"/>
       </p:transition>
     </mc:Choice>
     <mc:Fallback xmlns="">
@@ -8346,8 +8490,8 @@
   </p:clrMapOvr>
   <mc:AlternateContent xmlns:mc="http://schemas.openxmlformats.org/markup-compatibility/2006" xmlns:p14="http://schemas.microsoft.com/office/powerpoint/2010/main">
     <mc:Choice Requires="p14">
-      <p:transition spd="slow" p14:dur="1200">
-        <p14:prism/>
+      <p:transition spd="slow" p14:dur="1300">
+        <p14:pan dir="u"/>
       </p:transition>
     </mc:Choice>
     <mc:Fallback xmlns="">
@@ -9401,13 +9545,13 @@
   <p:clrMapOvr>
     <a:masterClrMapping/>
   </p:clrMapOvr>
-  <mc:AlternateContent xmlns:mc="http://schemas.openxmlformats.org/markup-compatibility/2006">
-    <mc:Choice xmlns:p14="http://schemas.microsoft.com/office/powerpoint/2010/main" Requires="p14">
-      <p:transition spd="slow" p14:dur="1200">
-        <p14:prism/>
+  <mc:AlternateContent xmlns:mc="http://schemas.openxmlformats.org/markup-compatibility/2006" xmlns:p14="http://schemas.microsoft.com/office/powerpoint/2010/main">
+    <mc:Choice Requires="p14">
+      <p:transition spd="slow" p14:dur="1300">
+        <p14:pan dir="u"/>
       </p:transition>
     </mc:Choice>
-    <mc:Fallback>
+    <mc:Fallback xmlns="">
       <p:transition spd="slow">
         <p:fade/>
       </p:transition>
@@ -10093,13 +10237,13 @@
   <p:clrMapOvr>
     <a:masterClrMapping/>
   </p:clrMapOvr>
-  <mc:AlternateContent xmlns:mc="http://schemas.openxmlformats.org/markup-compatibility/2006">
-    <mc:Choice xmlns:p14="http://schemas.microsoft.com/office/powerpoint/2010/main" Requires="p14">
-      <p:transition spd="slow" p14:dur="1200">
-        <p14:prism/>
+  <mc:AlternateContent xmlns:mc="http://schemas.openxmlformats.org/markup-compatibility/2006" xmlns:p14="http://schemas.microsoft.com/office/powerpoint/2010/main">
+    <mc:Choice Requires="p14">
+      <p:transition spd="slow" p14:dur="1300">
+        <p14:pan dir="u"/>
       </p:transition>
     </mc:Choice>
-    <mc:Fallback>
+    <mc:Fallback xmlns="">
       <p:transition spd="slow">
         <p:fade/>
       </p:transition>
@@ -10493,13 +10637,13 @@
   <p:clrMapOvr>
     <a:masterClrMapping/>
   </p:clrMapOvr>
-  <mc:AlternateContent xmlns:mc="http://schemas.openxmlformats.org/markup-compatibility/2006">
-    <mc:Choice xmlns:p14="http://schemas.microsoft.com/office/powerpoint/2010/main" Requires="p14">
-      <p:transition spd="slow" p14:dur="1200">
-        <p14:prism/>
+  <mc:AlternateContent xmlns:mc="http://schemas.openxmlformats.org/markup-compatibility/2006" xmlns:p14="http://schemas.microsoft.com/office/powerpoint/2010/main">
+    <mc:Choice Requires="p14">
+      <p:transition spd="slow" p14:dur="1300">
+        <p14:pan dir="u"/>
       </p:transition>
     </mc:Choice>
-    <mc:Fallback>
+    <mc:Fallback xmlns="">
       <p:transition spd="slow">
         <p:fade/>
       </p:transition>
@@ -10785,13 +10929,13 @@
   <p:clrMapOvr>
     <a:masterClrMapping/>
   </p:clrMapOvr>
-  <mc:AlternateContent xmlns:mc="http://schemas.openxmlformats.org/markup-compatibility/2006">
-    <mc:Choice xmlns:p14="http://schemas.microsoft.com/office/powerpoint/2010/main" Requires="p14">
-      <p:transition spd="slow" p14:dur="1200">
-        <p14:prism/>
+  <mc:AlternateContent xmlns:mc="http://schemas.openxmlformats.org/markup-compatibility/2006" xmlns:p14="http://schemas.microsoft.com/office/powerpoint/2010/main">
+    <mc:Choice Requires="p14">
+      <p:transition spd="slow" p14:dur="1300">
+        <p14:pan dir="u"/>
       </p:transition>
     </mc:Choice>
-    <mc:Fallback>
+    <mc:Fallback xmlns="">
       <p:transition spd="slow">
         <p:fade/>
       </p:transition>
@@ -10876,7 +11020,7 @@
           <a:lstStyle/>
           <a:p>
             <a:r>
-              <a:rPr lang="it-IT" sz="2400" b="1" dirty="0">
+              <a:rPr lang="it-IT" sz="2400" b="1">
                 <a:solidFill>
                   <a:srgbClr val="971720"/>
                 </a:solidFill>
@@ -10921,251 +11065,23 @@
           <a:lstStyle/>
           <a:p>
             <a:r>
-              <a:rPr lang="it-IT" dirty="0">
-                <a:latin typeface="Century Gothic" panose="020B0502020202020204" pitchFamily="34" charset="0"/>
-              </a:rPr>
-              <a:t>The </a:t>
-            </a:r>
-            <a:r>
-              <a:rPr lang="it-IT" dirty="0" err="1">
-                <a:latin typeface="Century Gothic" panose="020B0502020202020204" pitchFamily="34" charset="0"/>
-              </a:rPr>
-              <a:t>behaviour</a:t>
-            </a:r>
-            <a:r>
-              <a:rPr lang="it-IT" dirty="0">
-                <a:latin typeface="Century Gothic" panose="020B0502020202020204" pitchFamily="34" charset="0"/>
-              </a:rPr>
-              <a:t> of </a:t>
-            </a:r>
-            <a:r>
-              <a:rPr lang="it-IT" dirty="0" err="1">
-                <a:latin typeface="Century Gothic" panose="020B0502020202020204" pitchFamily="34" charset="0"/>
-              </a:rPr>
-              <a:t>this</a:t>
-            </a:r>
-            <a:r>
-              <a:rPr lang="it-IT" dirty="0">
-                <a:latin typeface="Century Gothic" panose="020B0502020202020204" pitchFamily="34" charset="0"/>
-              </a:rPr>
-              <a:t> multi-robot system </a:t>
-            </a:r>
-            <a:r>
-              <a:rPr lang="it-IT" dirty="0" err="1">
-                <a:latin typeface="Century Gothic" panose="020B0502020202020204" pitchFamily="34" charset="0"/>
-              </a:rPr>
-              <a:t>could</a:t>
-            </a:r>
-            <a:r>
-              <a:rPr lang="it-IT" dirty="0">
-                <a:latin typeface="Century Gothic" panose="020B0502020202020204" pitchFamily="34" charset="0"/>
-              </a:rPr>
-              <a:t> be </a:t>
-            </a:r>
-            <a:r>
-              <a:rPr lang="it-IT" dirty="0" err="1">
-                <a:latin typeface="Century Gothic" panose="020B0502020202020204" pitchFamily="34" charset="0"/>
-              </a:rPr>
-              <a:t>implemented</a:t>
-            </a:r>
-            <a:r>
-              <a:rPr lang="it-IT" dirty="0">
-                <a:latin typeface="Century Gothic" panose="020B0502020202020204" pitchFamily="34" charset="0"/>
-              </a:rPr>
-              <a:t> in </a:t>
-            </a:r>
-            <a:r>
-              <a:rPr lang="it-IT" dirty="0" err="1">
-                <a:latin typeface="Century Gothic" panose="020B0502020202020204" pitchFamily="34" charset="0"/>
-              </a:rPr>
-              <a:t>several</a:t>
-            </a:r>
-            <a:r>
-              <a:rPr lang="it-IT" dirty="0">
-                <a:latin typeface="Century Gothic" panose="020B0502020202020204" pitchFamily="34" charset="0"/>
-              </a:rPr>
-              <a:t> </a:t>
-            </a:r>
-            <a:r>
-              <a:rPr lang="it-IT" dirty="0" err="1">
-                <a:latin typeface="Century Gothic" panose="020B0502020202020204" pitchFamily="34" charset="0"/>
-              </a:rPr>
-              <a:t>applications</a:t>
-            </a:r>
-            <a:r>
-              <a:rPr lang="it-IT" dirty="0">
-                <a:latin typeface="Century Gothic" panose="020B0502020202020204" pitchFamily="34" charset="0"/>
-              </a:rPr>
-              <a:t>, from industrial to social fields, so the </a:t>
-            </a:r>
-            <a:r>
-              <a:rPr lang="it-IT" dirty="0" err="1">
-                <a:latin typeface="Century Gothic" panose="020B0502020202020204" pitchFamily="34" charset="0"/>
-              </a:rPr>
-              <a:t>intent</a:t>
-            </a:r>
-            <a:r>
-              <a:rPr lang="it-IT" dirty="0">
-                <a:latin typeface="Century Gothic" panose="020B0502020202020204" pitchFamily="34" charset="0"/>
-              </a:rPr>
-              <a:t> </a:t>
-            </a:r>
-            <a:r>
-              <a:rPr lang="it-IT" dirty="0" err="1">
-                <a:latin typeface="Century Gothic" panose="020B0502020202020204" pitchFamily="34" charset="0"/>
-              </a:rPr>
-              <a:t>was</a:t>
-            </a:r>
-            <a:r>
-              <a:rPr lang="it-IT" dirty="0">
-                <a:latin typeface="Century Gothic" panose="020B0502020202020204" pitchFamily="34" charset="0"/>
-              </a:rPr>
-              <a:t> to </a:t>
-            </a:r>
-            <a:r>
-              <a:rPr lang="it-IT" dirty="0" err="1">
-                <a:latin typeface="Century Gothic" panose="020B0502020202020204" pitchFamily="34" charset="0"/>
-              </a:rPr>
-              <a:t>choose</a:t>
-            </a:r>
-            <a:r>
-              <a:rPr lang="it-IT" dirty="0">
-                <a:latin typeface="Century Gothic" panose="020B0502020202020204" pitchFamily="34" charset="0"/>
-              </a:rPr>
-              <a:t> an </a:t>
-            </a:r>
-            <a:r>
-              <a:rPr lang="it-IT" dirty="0" err="1">
-                <a:latin typeface="Century Gothic" panose="020B0502020202020204" pitchFamily="34" charset="0"/>
-              </a:rPr>
-              <a:t>example</a:t>
-            </a:r>
-            <a:r>
-              <a:rPr lang="it-IT" dirty="0">
-                <a:latin typeface="Century Gothic" panose="020B0502020202020204" pitchFamily="34" charset="0"/>
-              </a:rPr>
-              <a:t> </a:t>
-            </a:r>
-            <a:r>
-              <a:rPr lang="it-IT" dirty="0" err="1">
-                <a:latin typeface="Century Gothic" panose="020B0502020202020204" pitchFamily="34" charset="0"/>
-              </a:rPr>
-              <a:t>but</a:t>
-            </a:r>
-            <a:r>
-              <a:rPr lang="it-IT" dirty="0">
-                <a:latin typeface="Century Gothic" panose="020B0502020202020204" pitchFamily="34" charset="0"/>
-              </a:rPr>
-              <a:t> making </a:t>
-            </a:r>
-            <a:r>
-              <a:rPr lang="it-IT" dirty="0" err="1">
-                <a:latin typeface="Century Gothic" panose="020B0502020202020204" pitchFamily="34" charset="0"/>
-              </a:rPr>
-              <a:t>it</a:t>
-            </a:r>
-            <a:r>
-              <a:rPr lang="it-IT" dirty="0">
-                <a:latin typeface="Century Gothic" panose="020B0502020202020204" pitchFamily="34" charset="0"/>
-              </a:rPr>
-              <a:t> </a:t>
-            </a:r>
-            <a:r>
-              <a:rPr lang="it-IT" dirty="0" err="1">
-                <a:latin typeface="Century Gothic" panose="020B0502020202020204" pitchFamily="34" charset="0"/>
-              </a:rPr>
-              <a:t>very</a:t>
-            </a:r>
-            <a:r>
-              <a:rPr lang="it-IT" dirty="0">
-                <a:latin typeface="Century Gothic" panose="020B0502020202020204" pitchFamily="34" charset="0"/>
-              </a:rPr>
-              <a:t> easy to be </a:t>
-            </a:r>
-            <a:r>
-              <a:rPr lang="it-IT" dirty="0" err="1">
-                <a:latin typeface="Century Gothic" panose="020B0502020202020204" pitchFamily="34" charset="0"/>
-              </a:rPr>
-              <a:t>changed</a:t>
-            </a:r>
-            <a:r>
-              <a:rPr lang="it-IT" dirty="0">
-                <a:latin typeface="Century Gothic" panose="020B0502020202020204" pitchFamily="34" charset="0"/>
-              </a:rPr>
-              <a:t> and </a:t>
-            </a:r>
-            <a:r>
-              <a:rPr lang="it-IT" dirty="0" err="1">
-                <a:latin typeface="Century Gothic" panose="020B0502020202020204" pitchFamily="34" charset="0"/>
-              </a:rPr>
-              <a:t>adapted</a:t>
-            </a:r>
-            <a:r>
-              <a:rPr lang="it-IT" dirty="0">
-                <a:latin typeface="Century Gothic" panose="020B0502020202020204" pitchFamily="34" charset="0"/>
-              </a:rPr>
-              <a:t> to </a:t>
-            </a:r>
-            <a:r>
-              <a:rPr lang="it-IT" dirty="0" err="1">
-                <a:latin typeface="Century Gothic" panose="020B0502020202020204" pitchFamily="34" charset="0"/>
-              </a:rPr>
-              <a:t>different</a:t>
-            </a:r>
-            <a:r>
-              <a:rPr lang="it-IT" dirty="0">
-                <a:latin typeface="Century Gothic" panose="020B0502020202020204" pitchFamily="34" charset="0"/>
-              </a:rPr>
-              <a:t> </a:t>
-            </a:r>
-            <a:r>
-              <a:rPr lang="it-IT" dirty="0" err="1">
-                <a:latin typeface="Century Gothic" panose="020B0502020202020204" pitchFamily="34" charset="0"/>
-              </a:rPr>
-              <a:t>cases</a:t>
-            </a:r>
-            <a:r>
-              <a:rPr lang="it-IT" dirty="0">
-                <a:latin typeface="Century Gothic" panose="020B0502020202020204" pitchFamily="34" charset="0"/>
-              </a:rPr>
-              <a:t>. </a:t>
-            </a:r>
-          </a:p>
-          <a:p>
-            <a:endParaRPr lang="it-IT" dirty="0">
+              <a:rPr lang="it-IT">
+                <a:latin typeface="Century Gothic" panose="020B0502020202020204" pitchFamily="34" charset="0"/>
+              </a:rPr>
+              <a:t>The behaviour of this multi-robot system could be implemented in several applications, from industrial to social fields, so the intent was to choose an example but making it very easy to be changed and adapted to different cases. </a:t>
+            </a:r>
+          </a:p>
+          <a:p>
+            <a:endParaRPr lang="it-IT">
               <a:latin typeface="Century Gothic" panose="020B0502020202020204" pitchFamily="34" charset="0"/>
             </a:endParaRPr>
           </a:p>
           <a:p>
             <a:r>
-              <a:rPr lang="it-IT" dirty="0">
-                <a:latin typeface="Century Gothic" panose="020B0502020202020204" pitchFamily="34" charset="0"/>
-              </a:rPr>
-              <a:t>The </a:t>
-            </a:r>
-            <a:r>
-              <a:rPr lang="it-IT" dirty="0" err="1">
-                <a:latin typeface="Century Gothic" panose="020B0502020202020204" pitchFamily="34" charset="0"/>
-              </a:rPr>
-              <a:t>main</a:t>
-            </a:r>
-            <a:r>
-              <a:rPr lang="it-IT" dirty="0">
-                <a:latin typeface="Century Gothic" panose="020B0502020202020204" pitchFamily="34" charset="0"/>
-              </a:rPr>
-              <a:t> goal </a:t>
-            </a:r>
-            <a:r>
-              <a:rPr lang="it-IT" dirty="0" err="1">
-                <a:latin typeface="Century Gothic" panose="020B0502020202020204" pitchFamily="34" charset="0"/>
-              </a:rPr>
-              <a:t>was</a:t>
-            </a:r>
-            <a:r>
-              <a:rPr lang="it-IT" dirty="0">
-                <a:latin typeface="Century Gothic" panose="020B0502020202020204" pitchFamily="34" charset="0"/>
-              </a:rPr>
-              <a:t> for the project to be:</a:t>
+              <a:rPr lang="it-IT">
+                <a:latin typeface="Century Gothic" panose="020B0502020202020204" pitchFamily="34" charset="0"/>
+              </a:rPr>
+              <a:t>The main goal was for the project to be:</a:t>
             </a:r>
           </a:p>
           <a:p>
@@ -11174,7 +11090,7 @@
               <a:buChar char="•"/>
             </a:pPr>
             <a:r>
-              <a:rPr lang="it-IT" dirty="0">
+              <a:rPr lang="it-IT">
                 <a:latin typeface="Century Gothic" panose="020B0502020202020204" pitchFamily="34" charset="0"/>
               </a:rPr>
               <a:t>Modular</a:t>
@@ -11186,14 +11102,11 @@
               <a:buChar char="•"/>
             </a:pPr>
             <a:r>
-              <a:rPr lang="it-IT" dirty="0" err="1">
+              <a:rPr lang="it-IT">
                 <a:latin typeface="Century Gothic" panose="020B0502020202020204" pitchFamily="34" charset="0"/>
               </a:rPr>
               <a:t>Generic</a:t>
             </a:r>
-            <a:endParaRPr lang="it-IT" dirty="0">
-              <a:latin typeface="Century Gothic" panose="020B0502020202020204" pitchFamily="34" charset="0"/>
-            </a:endParaRPr>
           </a:p>
           <a:p>
             <a:pPr marL="285750" indent="-285750">
@@ -11201,139 +11114,31 @@
               <a:buChar char="•"/>
             </a:pPr>
             <a:r>
-              <a:rPr lang="it-IT" dirty="0">
-                <a:latin typeface="Century Gothic" panose="020B0502020202020204" pitchFamily="34" charset="0"/>
-              </a:rPr>
-              <a:t>Easy to </a:t>
-            </a:r>
-            <a:r>
-              <a:rPr lang="it-IT" dirty="0" err="1">
-                <a:latin typeface="Century Gothic" panose="020B0502020202020204" pitchFamily="34" charset="0"/>
-              </a:rPr>
-              <a:t>understand</a:t>
-            </a:r>
-            <a:r>
-              <a:rPr lang="it-IT" dirty="0">
-                <a:latin typeface="Century Gothic" panose="020B0502020202020204" pitchFamily="34" charset="0"/>
-              </a:rPr>
-              <a:t> from a </a:t>
-            </a:r>
-            <a:r>
-              <a:rPr lang="it-IT" dirty="0" err="1">
-                <a:latin typeface="Century Gothic" panose="020B0502020202020204" pitchFamily="34" charset="0"/>
-              </a:rPr>
-              <a:t>potential</a:t>
-            </a:r>
-            <a:r>
-              <a:rPr lang="it-IT" dirty="0">
-                <a:latin typeface="Century Gothic" panose="020B0502020202020204" pitchFamily="34" charset="0"/>
-              </a:rPr>
-              <a:t> user point of </a:t>
-            </a:r>
-            <a:r>
-              <a:rPr lang="it-IT" dirty="0" err="1">
-                <a:latin typeface="Century Gothic" panose="020B0502020202020204" pitchFamily="34" charset="0"/>
-              </a:rPr>
-              <a:t>view</a:t>
-            </a:r>
-            <a:endParaRPr lang="it-IT" dirty="0">
-              <a:latin typeface="Century Gothic" panose="020B0502020202020204" pitchFamily="34" charset="0"/>
-            </a:endParaRPr>
+              <a:rPr lang="it-IT">
+                <a:latin typeface="Century Gothic" panose="020B0502020202020204" pitchFamily="34" charset="0"/>
+              </a:rPr>
+              <a:t>Easy to understand from a potential user point of view</a:t>
+            </a:r>
           </a:p>
           <a:p>
             <a:pPr marL="285750" indent="-285750">
               <a:buFont typeface="Arial" panose="020B0604020202020204" pitchFamily="34" charset="0"/>
               <a:buChar char="•"/>
             </a:pPr>
+            <a:endParaRPr lang="it-IT">
+              <a:latin typeface="Century Gothic" panose="020B0502020202020204" pitchFamily="34" charset="0"/>
+            </a:endParaRPr>
+          </a:p>
+          <a:p>
+            <a:r>
+              <a:rPr lang="it-IT">
+                <a:latin typeface="Century Gothic" panose="020B0502020202020204" pitchFamily="34" charset="0"/>
+              </a:rPr>
+              <a:t>Anyway, in order to make a practical example, the presentation will be set in an industrial environment.</a:t>
+            </a:r>
             <a:endParaRPr lang="it-IT" dirty="0">
               <a:latin typeface="Century Gothic" panose="020B0502020202020204" pitchFamily="34" charset="0"/>
             </a:endParaRPr>
-          </a:p>
-          <a:p>
-            <a:r>
-              <a:rPr lang="it-IT" dirty="0" err="1">
-                <a:latin typeface="Century Gothic" panose="020B0502020202020204" pitchFamily="34" charset="0"/>
-              </a:rPr>
-              <a:t>Anyway</a:t>
-            </a:r>
-            <a:r>
-              <a:rPr lang="it-IT" dirty="0">
-                <a:latin typeface="Century Gothic" panose="020B0502020202020204" pitchFamily="34" charset="0"/>
-              </a:rPr>
-              <a:t>, in </a:t>
-            </a:r>
-            <a:r>
-              <a:rPr lang="it-IT" dirty="0" err="1">
-                <a:latin typeface="Century Gothic" panose="020B0502020202020204" pitchFamily="34" charset="0"/>
-              </a:rPr>
-              <a:t>order</a:t>
-            </a:r>
-            <a:r>
-              <a:rPr lang="it-IT" dirty="0">
-                <a:latin typeface="Century Gothic" panose="020B0502020202020204" pitchFamily="34" charset="0"/>
-              </a:rPr>
-              <a:t> to make a </a:t>
-            </a:r>
-            <a:r>
-              <a:rPr lang="it-IT" dirty="0" err="1">
-                <a:latin typeface="Century Gothic" panose="020B0502020202020204" pitchFamily="34" charset="0"/>
-              </a:rPr>
-              <a:t>practical</a:t>
-            </a:r>
-            <a:r>
-              <a:rPr lang="it-IT" dirty="0">
-                <a:latin typeface="Century Gothic" panose="020B0502020202020204" pitchFamily="34" charset="0"/>
-              </a:rPr>
-              <a:t> </a:t>
-            </a:r>
-            <a:r>
-              <a:rPr lang="it-IT" dirty="0" err="1">
-                <a:latin typeface="Century Gothic" panose="020B0502020202020204" pitchFamily="34" charset="0"/>
-              </a:rPr>
-              <a:t>example</a:t>
-            </a:r>
-            <a:r>
-              <a:rPr lang="it-IT" dirty="0">
-                <a:latin typeface="Century Gothic" panose="020B0502020202020204" pitchFamily="34" charset="0"/>
-              </a:rPr>
-              <a:t>, the </a:t>
-            </a:r>
-            <a:r>
-              <a:rPr lang="it-IT" dirty="0" err="1">
-                <a:latin typeface="Century Gothic" panose="020B0502020202020204" pitchFamily="34" charset="0"/>
-              </a:rPr>
-              <a:t>presentation</a:t>
-            </a:r>
-            <a:r>
-              <a:rPr lang="it-IT" dirty="0">
-                <a:latin typeface="Century Gothic" panose="020B0502020202020204" pitchFamily="34" charset="0"/>
-              </a:rPr>
-              <a:t> </a:t>
-            </a:r>
-            <a:r>
-              <a:rPr lang="it-IT" dirty="0" err="1">
-                <a:latin typeface="Century Gothic" panose="020B0502020202020204" pitchFamily="34" charset="0"/>
-              </a:rPr>
-              <a:t>will</a:t>
-            </a:r>
-            <a:r>
-              <a:rPr lang="it-IT" dirty="0">
-                <a:latin typeface="Century Gothic" panose="020B0502020202020204" pitchFamily="34" charset="0"/>
-              </a:rPr>
-              <a:t> be set in an industrial </a:t>
-            </a:r>
-            <a:r>
-              <a:rPr lang="it-IT" dirty="0" err="1">
-                <a:latin typeface="Century Gothic" panose="020B0502020202020204" pitchFamily="34" charset="0"/>
-              </a:rPr>
-              <a:t>environment</a:t>
-            </a:r>
-            <a:r>
-              <a:rPr lang="it-IT" dirty="0">
-                <a:latin typeface="Century Gothic" panose="020B0502020202020204" pitchFamily="34" charset="0"/>
-              </a:rPr>
-              <a:t>.</a:t>
-            </a:r>
           </a:p>
         </p:txBody>
       </p:sp>
@@ -11349,8 +11154,8 @@
   </p:clrMapOvr>
   <mc:AlternateContent xmlns:mc="http://schemas.openxmlformats.org/markup-compatibility/2006" xmlns:p14="http://schemas.microsoft.com/office/powerpoint/2010/main">
     <mc:Choice Requires="p14">
-      <p:transition spd="slow" p14:dur="1200">
-        <p14:prism/>
+      <p:transition spd="slow" p14:dur="1300">
+        <p14:pan dir="u"/>
       </p:transition>
     </mc:Choice>
     <mc:Fallback xmlns="">
@@ -11693,13 +11498,13 @@
   <p:clrMapOvr>
     <a:masterClrMapping/>
   </p:clrMapOvr>
-  <mc:AlternateContent xmlns:mc="http://schemas.openxmlformats.org/markup-compatibility/2006">
-    <mc:Choice xmlns:p14="http://schemas.microsoft.com/office/powerpoint/2010/main" Requires="p14">
-      <p:transition spd="slow" p14:dur="1200">
-        <p14:prism/>
+  <mc:AlternateContent xmlns:mc="http://schemas.openxmlformats.org/markup-compatibility/2006" xmlns:p14="http://schemas.microsoft.com/office/powerpoint/2010/main">
+    <mc:Choice Requires="p14">
+      <p:transition spd="slow" p14:dur="1300">
+        <p14:pan dir="u"/>
       </p:transition>
     </mc:Choice>
-    <mc:Fallback>
+    <mc:Fallback xmlns="">
       <p:transition spd="slow">
         <p:fade/>
       </p:transition>
@@ -12151,13 +11956,13 @@
   <p:clrMapOvr>
     <a:masterClrMapping/>
   </p:clrMapOvr>
-  <mc:AlternateContent xmlns:mc="http://schemas.openxmlformats.org/markup-compatibility/2006">
-    <mc:Choice xmlns:p14="http://schemas.microsoft.com/office/powerpoint/2010/main" Requires="p14">
-      <p:transition spd="slow" p14:dur="1200">
-        <p14:prism/>
+  <mc:AlternateContent xmlns:mc="http://schemas.openxmlformats.org/markup-compatibility/2006" xmlns:p14="http://schemas.microsoft.com/office/powerpoint/2010/main">
+    <mc:Choice Requires="p14">
+      <p:transition spd="slow" p14:dur="1300">
+        <p14:pan dir="u"/>
       </p:transition>
     </mc:Choice>
-    <mc:Fallback>
+    <mc:Fallback xmlns="">
       <p:transition spd="slow">
         <p:fade/>
       </p:transition>
@@ -12536,7 +12341,7 @@
               <a:rPr lang="it-IT" sz="1600" dirty="0" err="1">
                 <a:latin typeface="Century Gothic" panose="020B0502020202020204" pitchFamily="34" charset="0"/>
               </a:rPr>
-              <a:t>configuration</a:t>
+              <a:t>configurations</a:t>
             </a:r>
             <a:r>
               <a:rPr lang="it-IT" sz="1600" dirty="0">
@@ -12713,13 +12518,13 @@
   <p:clrMapOvr>
     <a:masterClrMapping/>
   </p:clrMapOvr>
-  <mc:AlternateContent xmlns:mc="http://schemas.openxmlformats.org/markup-compatibility/2006">
-    <mc:Choice xmlns:p14="http://schemas.microsoft.com/office/powerpoint/2010/main" Requires="p14">
-      <p:transition spd="slow" p14:dur="1200">
-        <p14:prism/>
+  <mc:AlternateContent xmlns:mc="http://schemas.openxmlformats.org/markup-compatibility/2006" xmlns:p14="http://schemas.microsoft.com/office/powerpoint/2010/main">
+    <mc:Choice Requires="p14">
+      <p:transition spd="slow" p14:dur="1300">
+        <p14:pan dir="u"/>
       </p:transition>
     </mc:Choice>
-    <mc:Fallback>
+    <mc:Fallback xmlns="">
       <p:transition spd="slow">
         <p:fade/>
       </p:transition>
@@ -13208,7 +13013,7 @@
         <p:spPr>
           <a:xfrm>
             <a:off x="566530" y="4401154"/>
-            <a:ext cx="7881731" cy="1661993"/>
+            <a:ext cx="7881731" cy="2092881"/>
           </a:xfrm>
           <a:prstGeom prst="rect">
             <a:avLst/>
@@ -13693,6 +13498,103 @@
                 <a:latin typeface="Century Gothic" panose="020B0502020202020204" pitchFamily="34" charset="0"/>
               </a:rPr>
               <a:t> work.</a:t>
+            </a:r>
+          </a:p>
+          <a:p>
+            <a:endParaRPr lang="it-IT" sz="1400" dirty="0">
+              <a:latin typeface="Century Gothic" panose="020B0502020202020204" pitchFamily="34" charset="0"/>
+            </a:endParaRPr>
+          </a:p>
+          <a:p>
+            <a:r>
+              <a:rPr lang="it-IT" sz="1400" dirty="0">
+                <a:latin typeface="Century Gothic" panose="020B0502020202020204" pitchFamily="34" charset="0"/>
+              </a:rPr>
+              <a:t>Last </a:t>
+            </a:r>
+            <a:r>
+              <a:rPr lang="it-IT" sz="1400" dirty="0" err="1">
+                <a:latin typeface="Century Gothic" panose="020B0502020202020204" pitchFamily="34" charset="0"/>
+              </a:rPr>
+              <a:t>reminder</a:t>
+            </a:r>
+            <a:r>
+              <a:rPr lang="it-IT" sz="1400" dirty="0">
+                <a:latin typeface="Century Gothic" panose="020B0502020202020204" pitchFamily="34" charset="0"/>
+              </a:rPr>
+              <a:t>: </a:t>
+            </a:r>
+            <a:r>
+              <a:rPr lang="it-IT" sz="1400" dirty="0" err="1">
+                <a:latin typeface="Century Gothic" panose="020B0502020202020204" pitchFamily="34" charset="0"/>
+              </a:rPr>
+              <a:t>move</a:t>
+            </a:r>
+            <a:r>
+              <a:rPr lang="it-IT" sz="1400" dirty="0">
+                <a:latin typeface="Century Gothic" panose="020B0502020202020204" pitchFamily="34" charset="0"/>
+              </a:rPr>
+              <a:t> the «</a:t>
+            </a:r>
+            <a:r>
+              <a:rPr lang="it-IT" sz="1400" dirty="0" err="1">
+                <a:latin typeface="Century Gothic" panose="020B0502020202020204" pitchFamily="34" charset="0"/>
+              </a:rPr>
+              <a:t>all_aruco.launch</a:t>
+            </a:r>
+            <a:r>
+              <a:rPr lang="it-IT" sz="1400" dirty="0">
+                <a:latin typeface="Century Gothic" panose="020B0502020202020204" pitchFamily="34" charset="0"/>
+              </a:rPr>
+              <a:t>» file in </a:t>
+            </a:r>
+            <a:r>
+              <a:rPr lang="it-IT" sz="1400" dirty="0" err="1">
+                <a:latin typeface="Century Gothic" panose="020B0502020202020204" pitchFamily="34" charset="0"/>
+              </a:rPr>
+              <a:t>my</a:t>
+            </a:r>
+            <a:r>
+              <a:rPr lang="it-IT" sz="1400" dirty="0">
+                <a:latin typeface="Century Gothic" panose="020B0502020202020204" pitchFamily="34" charset="0"/>
+              </a:rPr>
+              <a:t> </a:t>
+            </a:r>
+            <a:r>
+              <a:rPr lang="it-IT" sz="1400" dirty="0" err="1">
+                <a:latin typeface="Century Gothic" panose="020B0502020202020204" pitchFamily="34" charset="0"/>
+              </a:rPr>
+              <a:t>own</a:t>
+            </a:r>
+            <a:r>
+              <a:rPr lang="it-IT" sz="1400" dirty="0">
+                <a:latin typeface="Century Gothic" panose="020B0502020202020204" pitchFamily="34" charset="0"/>
+              </a:rPr>
+              <a:t> package for </a:t>
+            </a:r>
+            <a:r>
+              <a:rPr lang="it-IT" sz="1400" dirty="0" err="1">
+                <a:latin typeface="Century Gothic" panose="020B0502020202020204" pitchFamily="34" charset="0"/>
+              </a:rPr>
+              <a:t>further</a:t>
+            </a:r>
+            <a:r>
+              <a:rPr lang="it-IT" sz="1400" dirty="0">
+                <a:latin typeface="Century Gothic" panose="020B0502020202020204" pitchFamily="34" charset="0"/>
+              </a:rPr>
+              <a:t> </a:t>
+            </a:r>
+            <a:r>
+              <a:rPr lang="it-IT" sz="1400" dirty="0" err="1">
+                <a:latin typeface="Century Gothic" panose="020B0502020202020204" pitchFamily="34" charset="0"/>
+              </a:rPr>
+              <a:t>precision</a:t>
+            </a:r>
+            <a:r>
+              <a:rPr lang="it-IT" sz="1400" dirty="0">
+                <a:latin typeface="Century Gothic" panose="020B0502020202020204" pitchFamily="34" charset="0"/>
+              </a:rPr>
+              <a:t>.</a:t>
             </a:r>
           </a:p>
         </p:txBody>
@@ -13707,13 +13609,13 @@
   <p:clrMapOvr>
     <a:masterClrMapping/>
   </p:clrMapOvr>
-  <mc:AlternateContent xmlns:mc="http://schemas.openxmlformats.org/markup-compatibility/2006">
-    <mc:Choice xmlns:p14="http://schemas.microsoft.com/office/powerpoint/2010/main" Requires="p14">
-      <p:transition spd="slow" p14:dur="1200">
-        <p14:prism/>
+  <mc:AlternateContent xmlns:mc="http://schemas.openxmlformats.org/markup-compatibility/2006" xmlns:p14="http://schemas.microsoft.com/office/powerpoint/2010/main">
+    <mc:Choice Requires="p14">
+      <p:transition spd="slow" p14:dur="1300">
+        <p14:pan dir="u"/>
       </p:transition>
     </mc:Choice>
-    <mc:Fallback>
+    <mc:Fallback xmlns="">
       <p:transition spd="slow">
         <p:fade/>
       </p:transition>
@@ -13840,8 +13742,8 @@
   </p:clrMapOvr>
   <mc:AlternateContent xmlns:mc="http://schemas.openxmlformats.org/markup-compatibility/2006" xmlns:p14="http://schemas.microsoft.com/office/powerpoint/2010/main">
     <mc:Choice Requires="p14">
-      <p:transition spd="slow" p14:dur="1200">
-        <p14:prism/>
+      <p:transition spd="slow" p14:dur="1300">
+        <p14:pan dir="u"/>
       </p:transition>
     </mc:Choice>
     <mc:Fallback xmlns="">
@@ -14349,8 +14251,8 @@
   </p:clrMapOvr>
   <mc:AlternateContent xmlns:mc="http://schemas.openxmlformats.org/markup-compatibility/2006" xmlns:p14="http://schemas.microsoft.com/office/powerpoint/2010/main">
     <mc:Choice Requires="p14">
-      <p:transition spd="slow" p14:dur="1200">
-        <p14:prism/>
+      <p:transition spd="slow" p14:dur="1300">
+        <p14:pan dir="u"/>
       </p:transition>
     </mc:Choice>
     <mc:Fallback xmlns="">
@@ -14703,7 +14605,7 @@
               <a:rPr lang="it-IT" sz="1400" dirty="0" err="1">
                 <a:latin typeface="Century Gothic" panose="020B0502020202020204" pitchFamily="34" charset="0"/>
               </a:rPr>
-              <a:t>took</a:t>
+              <a:t>taken</a:t>
             </a:r>
             <a:r>
               <a:rPr lang="it-IT" sz="1400" dirty="0">
@@ -15161,8 +15063,8 @@
   </p:clrMapOvr>
   <mc:AlternateContent xmlns:mc="http://schemas.openxmlformats.org/markup-compatibility/2006" xmlns:p14="http://schemas.microsoft.com/office/powerpoint/2010/main">
     <mc:Choice Requires="p14">
-      <p:transition spd="slow" p14:dur="1200">
-        <p14:prism/>
+      <p:transition spd="slow" p14:dur="1300">
+        <p14:pan dir="u"/>
       </p:transition>
     </mc:Choice>
     <mc:Fallback xmlns="">
@@ -15813,8 +15715,8 @@
   </p:clrMapOvr>
   <mc:AlternateContent xmlns:mc="http://schemas.openxmlformats.org/markup-compatibility/2006" xmlns:p14="http://schemas.microsoft.com/office/powerpoint/2010/main">
     <mc:Choice Requires="p14">
-      <p:transition spd="slow" p14:dur="1200">
-        <p14:prism/>
+      <p:transition spd="slow" p14:dur="1300">
+        <p14:pan dir="u"/>
       </p:transition>
     </mc:Choice>
     <mc:Fallback xmlns="">
@@ -15999,8 +15901,8 @@
   </p:clrMapOvr>
   <mc:AlternateContent xmlns:mc="http://schemas.openxmlformats.org/markup-compatibility/2006" xmlns:p14="http://schemas.microsoft.com/office/powerpoint/2010/main">
     <mc:Choice Requires="p14">
-      <p:transition spd="slow" p14:dur="1200">
-        <p14:prism/>
+      <p:transition spd="slow" p14:dur="1300">
+        <p14:pan dir="u"/>
       </p:transition>
     </mc:Choice>
     <mc:Fallback xmlns="">
@@ -16390,8 +16292,8 @@
   </p:clrMapOvr>
   <mc:AlternateContent xmlns:mc="http://schemas.openxmlformats.org/markup-compatibility/2006" xmlns:p14="http://schemas.microsoft.com/office/powerpoint/2010/main">
     <mc:Choice Requires="p14">
-      <p:transition spd="slow" p14:dur="1200">
-        <p14:prism/>
+      <p:transition spd="slow" p14:dur="1300">
+        <p14:pan dir="u"/>
       </p:transition>
     </mc:Choice>
     <mc:Fallback xmlns="">
@@ -16743,7 +16645,7 @@
               <a:rPr lang="it-IT" sz="1400" dirty="0">
                 <a:latin typeface="Century Gothic" panose="020B0502020202020204" pitchFamily="34" charset="0"/>
               </a:rPr>
-              <a:t> part on </a:t>
+              <a:t> on </a:t>
             </a:r>
             <a:r>
               <a:rPr lang="it-IT" sz="1400" dirty="0" err="1">
@@ -17503,8 +17405,8 @@
   </p:clrMapOvr>
   <mc:AlternateContent xmlns:mc="http://schemas.openxmlformats.org/markup-compatibility/2006" xmlns:p14="http://schemas.microsoft.com/office/powerpoint/2010/main">
     <mc:Choice Requires="p14">
-      <p:transition spd="slow" p14:dur="1200">
-        <p14:prism/>
+      <p:transition spd="slow" p14:dur="1300">
+        <p14:pan dir="u"/>
       </p:transition>
     </mc:Choice>
     <mc:Fallback xmlns="">
@@ -17829,8 +17731,8 @@
   </p:clrMapOvr>
   <mc:AlternateContent xmlns:mc="http://schemas.openxmlformats.org/markup-compatibility/2006" xmlns:p14="http://schemas.microsoft.com/office/powerpoint/2010/main">
     <mc:Choice Requires="p14">
-      <p:transition spd="slow" p14:dur="1200">
-        <p14:prism/>
+      <p:transition spd="slow" p14:dur="1300">
+        <p14:pan dir="u"/>
       </p:transition>
     </mc:Choice>
     <mc:Fallback xmlns="">

</xml_diff>